<commit_message>
small modifications to presentation
</commit_message>
<xml_diff>
--- a/weekly_dashboard/dashboard-03-01.pptx
+++ b/weekly_dashboard/dashboard-03-01.pptx
@@ -367,7 +367,7 @@
           <a:p>
             <a:fld id="{9B6EA536-0A02-024A-865C-9746DE76D2ED}" type="slidenum">
               <a:rPr lang="en-US" smtClean="0"/>
-              <a:t>‹#›</a:t>
+              <a:t>‹Nr.›</a:t>
             </a:fld>
             <a:endParaRPr lang="en-US"/>
           </a:p>
@@ -743,7 +743,7 @@
           <a:p>
             <a:fld id="{186C044C-C631-4C06-B937-BF52F1189CD5}" type="slidenum">
               <a:rPr lang="en-US" smtClean="0"/>
-              <a:t>‹#›</a:t>
+              <a:t>‹Nr.›</a:t>
             </a:fld>
             <a:endParaRPr lang="en-US"/>
           </a:p>
@@ -911,7 +911,7 @@
           <a:p>
             <a:fld id="{186C044C-C631-4C06-B937-BF52F1189CD5}" type="slidenum">
               <a:rPr lang="en-US" smtClean="0"/>
-              <a:t>‹#›</a:t>
+              <a:t>‹Nr.›</a:t>
             </a:fld>
             <a:endParaRPr lang="en-US"/>
           </a:p>
@@ -1089,7 +1089,7 @@
           <a:p>
             <a:fld id="{186C044C-C631-4C06-B937-BF52F1189CD5}" type="slidenum">
               <a:rPr lang="en-US" smtClean="0"/>
-              <a:t>‹#›</a:t>
+              <a:t>‹Nr.›</a:t>
             </a:fld>
             <a:endParaRPr lang="en-US"/>
           </a:p>
@@ -1257,7 +1257,7 @@
           <a:p>
             <a:fld id="{186C044C-C631-4C06-B937-BF52F1189CD5}" type="slidenum">
               <a:rPr lang="en-US" smtClean="0"/>
-              <a:t>‹#›</a:t>
+              <a:t>‹Nr.›</a:t>
             </a:fld>
             <a:endParaRPr lang="en-US"/>
           </a:p>
@@ -1502,7 +1502,7 @@
           <a:p>
             <a:fld id="{186C044C-C631-4C06-B937-BF52F1189CD5}" type="slidenum">
               <a:rPr lang="en-US" smtClean="0"/>
-              <a:t>‹#›</a:t>
+              <a:t>‹Nr.›</a:t>
             </a:fld>
             <a:endParaRPr lang="en-US"/>
           </a:p>
@@ -1731,7 +1731,7 @@
           <a:p>
             <a:fld id="{186C044C-C631-4C06-B937-BF52F1189CD5}" type="slidenum">
               <a:rPr lang="en-US" smtClean="0"/>
-              <a:t>‹#›</a:t>
+              <a:t>‹Nr.›</a:t>
             </a:fld>
             <a:endParaRPr lang="en-US"/>
           </a:p>
@@ -2095,7 +2095,7 @@
           <a:p>
             <a:fld id="{186C044C-C631-4C06-B937-BF52F1189CD5}" type="slidenum">
               <a:rPr lang="en-US" smtClean="0"/>
-              <a:t>‹#›</a:t>
+              <a:t>‹Nr.›</a:t>
             </a:fld>
             <a:endParaRPr lang="en-US"/>
           </a:p>
@@ -2212,7 +2212,7 @@
           <a:p>
             <a:fld id="{186C044C-C631-4C06-B937-BF52F1189CD5}" type="slidenum">
               <a:rPr lang="en-US" smtClean="0"/>
-              <a:t>‹#›</a:t>
+              <a:t>‹Nr.›</a:t>
             </a:fld>
             <a:endParaRPr lang="en-US"/>
           </a:p>
@@ -2307,7 +2307,7 @@
           <a:p>
             <a:fld id="{186C044C-C631-4C06-B937-BF52F1189CD5}" type="slidenum">
               <a:rPr lang="en-US" smtClean="0"/>
-              <a:t>‹#›</a:t>
+              <a:t>‹Nr.›</a:t>
             </a:fld>
             <a:endParaRPr lang="en-US"/>
           </a:p>
@@ -2582,7 +2582,7 @@
           <a:p>
             <a:fld id="{186C044C-C631-4C06-B937-BF52F1189CD5}" type="slidenum">
               <a:rPr lang="en-US" smtClean="0"/>
-              <a:t>‹#›</a:t>
+              <a:t>‹Nr.›</a:t>
             </a:fld>
             <a:endParaRPr lang="en-US"/>
           </a:p>
@@ -2834,7 +2834,7 @@
           <a:p>
             <a:fld id="{186C044C-C631-4C06-B937-BF52F1189CD5}" type="slidenum">
               <a:rPr lang="en-US" smtClean="0"/>
-              <a:t>‹#›</a:t>
+              <a:t>‹Nr.›</a:t>
             </a:fld>
             <a:endParaRPr lang="en-US"/>
           </a:p>
@@ -3081,7 +3081,7 @@
           <a:p>
             <a:fld id="{186C044C-C631-4C06-B937-BF52F1189CD5}" type="slidenum">
               <a:rPr lang="en-US" smtClean="0"/>
-              <a:t>‹#›</a:t>
+              <a:t>‹Nr.›</a:t>
             </a:fld>
             <a:endParaRPr lang="en-US"/>
           </a:p>
@@ -3852,7 +3852,7 @@
         <p:spPr>
           <a:xfrm>
             <a:off x="829733" y="2452688"/>
-            <a:ext cx="5190067" cy="646331"/>
+            <a:ext cx="5190067" cy="1200329"/>
           </a:xfrm>
           <a:prstGeom prst="rect">
             <a:avLst/>
@@ -3871,8 +3871,29 @@
             </a:pPr>
             <a:r>
               <a:rPr lang="en-US" dirty="0"/>
-              <a:t>Explore security flaws with the UC Davis Voice-over-IP (VoIP) implementation.</a:t>
-            </a:r>
+              <a:t>Explore security flaws with the UC Davis Voice-over-IP (VoIP) implementation</a:t>
+            </a:r>
+            <a:r>
+              <a:rPr lang="en-US" dirty="0" smtClean="0"/>
+              <a:t>.</a:t>
+            </a:r>
+          </a:p>
+          <a:p>
+            <a:pPr marL="285750" indent="-285750">
+              <a:buFont typeface="Arial" panose="020B0604020202020204" pitchFamily="34" charset="0"/>
+              <a:buChar char="•"/>
+            </a:pPr>
+            <a:r>
+              <a:rPr lang="en-US" dirty="0" smtClean="0"/>
+              <a:t>Focus on Privacy and Integrity</a:t>
+            </a:r>
+          </a:p>
+          <a:p>
+            <a:pPr marL="285750" indent="-285750">
+              <a:buFont typeface="Arial" panose="020B0604020202020204" pitchFamily="34" charset="0"/>
+              <a:buChar char="•"/>
+            </a:pPr>
+            <a:endParaRPr lang="en-US" dirty="0"/>
           </a:p>
         </p:txBody>
       </p:sp>
@@ -3914,8 +3935,13 @@
             </a:pPr>
             <a:r>
               <a:rPr lang="en-US" dirty="0"/>
-              <a:t>Yet to be completed: setting-up phones in the security lab </a:t>
-            </a:r>
+              <a:t>Yet to be completed: setting-up phones in the security </a:t>
+            </a:r>
+            <a:r>
+              <a:rPr lang="en-US" dirty="0" smtClean="0"/>
+              <a:t>lab, progress report</a:t>
+            </a:r>
+            <a:endParaRPr lang="en-US" dirty="0"/>
           </a:p>
           <a:p>
             <a:pPr marL="285750" indent="-285750">
@@ -3978,7 +4004,7 @@
         <p:spPr>
           <a:xfrm>
             <a:off x="6095998" y="4589120"/>
-            <a:ext cx="5190067" cy="646331"/>
+            <a:ext cx="5190067" cy="1200329"/>
           </a:xfrm>
           <a:prstGeom prst="rect">
             <a:avLst/>
@@ -4006,9 +4032,46 @@
               <a:buChar char="•"/>
             </a:pPr>
             <a:r>
+              <a:rPr lang="en-US" dirty="0" smtClean="0"/>
+              <a:t>Set </a:t>
+            </a:r>
+            <a:r>
               <a:rPr lang="en-US" dirty="0"/>
-              <a:t>Will set up a computer for packet sniffing</a:t>
-            </a:r>
+              <a:t>up a computer for packet </a:t>
+            </a:r>
+            <a:r>
+              <a:rPr lang="en-US" dirty="0" smtClean="0"/>
+              <a:t>sniffing</a:t>
+            </a:r>
+          </a:p>
+          <a:p>
+            <a:pPr marL="285750" indent="-285750">
+              <a:buFont typeface="Arial" panose="020B0604020202020204" pitchFamily="34" charset="0"/>
+              <a:buChar char="•"/>
+            </a:pPr>
+            <a:r>
+              <a:rPr lang="en-US" dirty="0" smtClean="0"/>
+              <a:t>Set up switch to complete setup</a:t>
+            </a:r>
+          </a:p>
+          <a:p>
+            <a:pPr marL="285750" indent="-285750">
+              <a:buFont typeface="Arial" panose="020B0604020202020204" pitchFamily="34" charset="0"/>
+              <a:buChar char="•"/>
+            </a:pPr>
+            <a:r>
+              <a:rPr lang="en-US" dirty="0" smtClean="0"/>
+              <a:t>Configure </a:t>
+            </a:r>
+            <a:r>
+              <a:rPr lang="en-US" dirty="0" smtClean="0"/>
+              <a:t>Wi</a:t>
+            </a:r>
+            <a:r>
+              <a:rPr lang="en-US" dirty="0" smtClean="0"/>
+              <a:t>reshark for SIP</a:t>
+            </a:r>
+            <a:endParaRPr lang="en-US" dirty="0"/>
           </a:p>
         </p:txBody>
       </p:sp>
@@ -4528,7 +4591,7 @@
         <p:spPr>
           <a:xfrm>
             <a:off x="838199" y="2452688"/>
-            <a:ext cx="5190067" cy="646331"/>
+            <a:ext cx="5190067" cy="923330"/>
           </a:xfrm>
           <a:prstGeom prst="rect">
             <a:avLst/>
@@ -4547,7 +4610,11 @@
             </a:pPr>
             <a:r>
               <a:rPr lang="en-US" dirty="0"/>
-              <a:t>Finished Lit Review</a:t>
+              <a:t>Finished Lit </a:t>
+            </a:r>
+            <a:r>
+              <a:rPr lang="en-US" dirty="0" smtClean="0"/>
+              <a:t>Review</a:t>
             </a:r>
           </a:p>
           <a:p>
@@ -4556,8 +4623,23 @@
               <a:buChar char="•"/>
             </a:pPr>
             <a:r>
+              <a:rPr lang="en-US" dirty="0" smtClean="0"/>
+              <a:t>Meeting with TD to set-up environment</a:t>
+            </a:r>
+            <a:endParaRPr lang="en-US" dirty="0"/>
+          </a:p>
+          <a:p>
+            <a:pPr marL="285750" indent="-285750">
+              <a:buFont typeface="Arial" panose="020B0604020202020204" pitchFamily="34" charset="0"/>
+              <a:buChar char="•"/>
+            </a:pPr>
+            <a:r>
               <a:rPr lang="en-US" dirty="0"/>
-              <a:t>Debugged phone connection issue at security lab</a:t>
+              <a:t>Debugged phone connection issue at security </a:t>
+            </a:r>
+            <a:r>
+              <a:rPr lang="en-US" dirty="0" smtClean="0"/>
+              <a:t>lab</a:t>
             </a:r>
           </a:p>
         </p:txBody>
@@ -4571,7 +4653,7 @@
         <p:spPr>
           <a:xfrm>
             <a:off x="6095999" y="2450245"/>
-            <a:ext cx="5190067" cy="646331"/>
+            <a:ext cx="5190067" cy="923330"/>
           </a:xfrm>
           <a:prstGeom prst="rect">
             <a:avLst/>
@@ -4590,7 +4672,11 @@
             </a:pPr>
             <a:r>
               <a:rPr lang="en-US" dirty="0"/>
-              <a:t>Finish phone set-up with switch</a:t>
+              <a:t>Finish phone set-up with </a:t>
+            </a:r>
+            <a:r>
+              <a:rPr lang="en-US" dirty="0" smtClean="0"/>
+              <a:t>switch</a:t>
             </a:r>
           </a:p>
           <a:p>
@@ -4599,8 +4685,23 @@
               <a:buChar char="•"/>
             </a:pPr>
             <a:r>
+              <a:rPr lang="en-US" dirty="0" smtClean="0"/>
+              <a:t>Install necessary software (Wireshark)</a:t>
+            </a:r>
+            <a:endParaRPr lang="en-US" dirty="0"/>
+          </a:p>
+          <a:p>
+            <a:pPr marL="285750" indent="-285750">
+              <a:buFont typeface="Arial" panose="020B0604020202020204" pitchFamily="34" charset="0"/>
+              <a:buChar char="•"/>
+            </a:pPr>
+            <a:r>
+              <a:rPr lang="en-US" dirty="0" smtClean="0"/>
+              <a:t>Sniff packets </a:t>
+            </a:r>
+            <a:r>
               <a:rPr lang="en-US" dirty="0"/>
-              <a:t>Packet sniff with Wireshark</a:t>
+              <a:t>with Wireshark</a:t>
             </a:r>
           </a:p>
         </p:txBody>
@@ -4614,7 +4715,7 @@
         <p:spPr>
           <a:xfrm>
             <a:off x="838198" y="4658723"/>
-            <a:ext cx="5190067" cy="646331"/>
+            <a:ext cx="5190067" cy="923330"/>
           </a:xfrm>
           <a:prstGeom prst="rect">
             <a:avLst/>
@@ -4633,7 +4734,11 @@
             </a:pPr>
             <a:r>
               <a:rPr lang="en-US" dirty="0"/>
-              <a:t>Phone port was without signal at security lab</a:t>
+              <a:t>Phone port was without signal at security </a:t>
+            </a:r>
+            <a:r>
+              <a:rPr lang="en-US" dirty="0" smtClean="0"/>
+              <a:t>lab</a:t>
             </a:r>
           </a:p>
           <a:p>
@@ -4642,9 +4747,16 @@
               <a:buChar char="•"/>
             </a:pPr>
             <a:r>
-              <a:rPr lang="en-US" dirty="0"/>
-              <a:t>Problem being fixed by IET</a:t>
-            </a:r>
+              <a:rPr lang="en-US" dirty="0" smtClean="0"/>
+              <a:t>Waited for delivery of switch to finish setup</a:t>
+            </a:r>
+          </a:p>
+          <a:p>
+            <a:pPr marL="285750" indent="-285750">
+              <a:buFont typeface="Arial" panose="020B0604020202020204" pitchFamily="34" charset="0"/>
+              <a:buChar char="•"/>
+            </a:pPr>
+            <a:endParaRPr lang="en-US" dirty="0"/>
           </a:p>
         </p:txBody>
       </p:sp>
@@ -4657,7 +4769,7 @@
         <p:spPr>
           <a:xfrm>
             <a:off x="6095998" y="4589120"/>
-            <a:ext cx="5190067" cy="646331"/>
+            <a:ext cx="5190067" cy="1200329"/>
           </a:xfrm>
           <a:prstGeom prst="rect">
             <a:avLst/>
@@ -4676,8 +4788,23 @@
             </a:pPr>
             <a:r>
               <a:rPr lang="en-US" dirty="0"/>
-              <a:t>How to configure Wireshark to be able to sniff packets?</a:t>
-            </a:r>
+              <a:t>How to configure Wireshark to be able to sniff </a:t>
+            </a:r>
+            <a:r>
+              <a:rPr lang="en-US" dirty="0" smtClean="0"/>
+              <a:t>SIP packets?</a:t>
+            </a:r>
+          </a:p>
+          <a:p>
+            <a:pPr marL="285750" indent="-285750">
+              <a:buFont typeface="Arial" panose="020B0604020202020204" pitchFamily="34" charset="0"/>
+              <a:buChar char="•"/>
+            </a:pPr>
+            <a:r>
+              <a:rPr lang="en-US" dirty="0" smtClean="0"/>
+              <a:t>How does custom hardware and network setup affect VoIP at UC Davis?</a:t>
+            </a:r>
+            <a:endParaRPr lang="en-US" dirty="0"/>
           </a:p>
         </p:txBody>
       </p:sp>

</xml_diff>